<commit_message>
Did some writing and plotting.
</commit_message>
<xml_diff>
--- a/Writing/Figs.pptx
+++ b/Writing/Figs.pptx
@@ -241,7 +241,7 @@
           <a:p>
             <a:fld id="{D5436C50-0FB6-4D02-BEC8-AE142D0D2100}" type="datetimeFigureOut">
               <a:rPr lang="en-US" smtClean="0"/>
-              <a:t>4/20/2017</a:t>
+              <a:t>5/9/2017</a:t>
             </a:fld>
             <a:endParaRPr lang="en-US"/>
           </a:p>
@@ -409,7 +409,7 @@
           <a:p>
             <a:fld id="{D5436C50-0FB6-4D02-BEC8-AE142D0D2100}" type="datetimeFigureOut">
               <a:rPr lang="en-US" smtClean="0"/>
-              <a:t>4/20/2017</a:t>
+              <a:t>5/9/2017</a:t>
             </a:fld>
             <a:endParaRPr lang="en-US"/>
           </a:p>
@@ -587,7 +587,7 @@
           <a:p>
             <a:fld id="{D5436C50-0FB6-4D02-BEC8-AE142D0D2100}" type="datetimeFigureOut">
               <a:rPr lang="en-US" smtClean="0"/>
-              <a:t>4/20/2017</a:t>
+              <a:t>5/9/2017</a:t>
             </a:fld>
             <a:endParaRPr lang="en-US"/>
           </a:p>
@@ -755,7 +755,7 @@
           <a:p>
             <a:fld id="{D5436C50-0FB6-4D02-BEC8-AE142D0D2100}" type="datetimeFigureOut">
               <a:rPr lang="en-US" smtClean="0"/>
-              <a:t>4/20/2017</a:t>
+              <a:t>5/9/2017</a:t>
             </a:fld>
             <a:endParaRPr lang="en-US"/>
           </a:p>
@@ -1000,7 +1000,7 @@
           <a:p>
             <a:fld id="{D5436C50-0FB6-4D02-BEC8-AE142D0D2100}" type="datetimeFigureOut">
               <a:rPr lang="en-US" smtClean="0"/>
-              <a:t>4/20/2017</a:t>
+              <a:t>5/9/2017</a:t>
             </a:fld>
             <a:endParaRPr lang="en-US"/>
           </a:p>
@@ -1229,7 +1229,7 @@
           <a:p>
             <a:fld id="{D5436C50-0FB6-4D02-BEC8-AE142D0D2100}" type="datetimeFigureOut">
               <a:rPr lang="en-US" smtClean="0"/>
-              <a:t>4/20/2017</a:t>
+              <a:t>5/9/2017</a:t>
             </a:fld>
             <a:endParaRPr lang="en-US"/>
           </a:p>
@@ -1593,7 +1593,7 @@
           <a:p>
             <a:fld id="{D5436C50-0FB6-4D02-BEC8-AE142D0D2100}" type="datetimeFigureOut">
               <a:rPr lang="en-US" smtClean="0"/>
-              <a:t>4/20/2017</a:t>
+              <a:t>5/9/2017</a:t>
             </a:fld>
             <a:endParaRPr lang="en-US"/>
           </a:p>
@@ -1710,7 +1710,7 @@
           <a:p>
             <a:fld id="{D5436C50-0FB6-4D02-BEC8-AE142D0D2100}" type="datetimeFigureOut">
               <a:rPr lang="en-US" smtClean="0"/>
-              <a:t>4/20/2017</a:t>
+              <a:t>5/9/2017</a:t>
             </a:fld>
             <a:endParaRPr lang="en-US"/>
           </a:p>
@@ -1805,7 +1805,7 @@
           <a:p>
             <a:fld id="{D5436C50-0FB6-4D02-BEC8-AE142D0D2100}" type="datetimeFigureOut">
               <a:rPr lang="en-US" smtClean="0"/>
-              <a:t>4/20/2017</a:t>
+              <a:t>5/9/2017</a:t>
             </a:fld>
             <a:endParaRPr lang="en-US"/>
           </a:p>
@@ -2080,7 +2080,7 @@
           <a:p>
             <a:fld id="{D5436C50-0FB6-4D02-BEC8-AE142D0D2100}" type="datetimeFigureOut">
               <a:rPr lang="en-US" smtClean="0"/>
-              <a:t>4/20/2017</a:t>
+              <a:t>5/9/2017</a:t>
             </a:fld>
             <a:endParaRPr lang="en-US"/>
           </a:p>
@@ -2332,7 +2332,7 @@
           <a:p>
             <a:fld id="{D5436C50-0FB6-4D02-BEC8-AE142D0D2100}" type="datetimeFigureOut">
               <a:rPr lang="en-US" smtClean="0"/>
-              <a:t>4/20/2017</a:t>
+              <a:t>5/9/2017</a:t>
             </a:fld>
             <a:endParaRPr lang="en-US"/>
           </a:p>
@@ -2543,7 +2543,7 @@
           <a:p>
             <a:fld id="{D5436C50-0FB6-4D02-BEC8-AE142D0D2100}" type="datetimeFigureOut">
               <a:rPr lang="en-US" smtClean="0"/>
-              <a:t>4/20/2017</a:t>
+              <a:t>5/9/2017</a:t>
             </a:fld>
             <a:endParaRPr lang="en-US"/>
           </a:p>
@@ -2950,13 +2950,606 @@
       </p:grpSpPr>
       <p:grpSp>
         <p:nvGrpSpPr>
+          <p:cNvPr id="9" name="Group 8"/>
+          <p:cNvGrpSpPr/>
+          <p:nvPr/>
+        </p:nvGrpSpPr>
+        <p:grpSpPr>
+          <a:xfrm>
+            <a:off x="2904280" y="77527"/>
+            <a:ext cx="3283276" cy="2685744"/>
+            <a:chOff x="4258805" y="606916"/>
+            <a:chExt cx="3283276" cy="2685744"/>
+          </a:xfrm>
+        </p:grpSpPr>
+        <p:pic>
+          <p:nvPicPr>
+            <p:cNvPr id="3" name="Picture 2" descr="A close up of a map&#10;&#10;Description generated with high confidence"/>
+            <p:cNvPicPr>
+              <a:picLocks noChangeAspect="1"/>
+            </p:cNvPicPr>
+            <p:nvPr/>
+          </p:nvPicPr>
+          <p:blipFill rotWithShape="1">
+            <a:blip r:embed="rId2">
+              <a:extLst>
+                <a:ext uri="{28A0092B-C50C-407E-A947-70E740481C1C}">
+                  <a14:useLocalDpi xmlns:a14="http://schemas.microsoft.com/office/drawing/2010/main" val="0"/>
+                </a:ext>
+              </a:extLst>
+            </a:blip>
+            <a:srcRect r="12662" b="11505"/>
+            <a:stretch/>
+          </p:blipFill>
+          <p:spPr>
+            <a:xfrm>
+              <a:off x="4258805" y="606916"/>
+              <a:ext cx="3207650" cy="2108783"/>
+            </a:xfrm>
+            <a:prstGeom prst="rect">
+              <a:avLst/>
+            </a:prstGeom>
+          </p:spPr>
+        </p:pic>
+        <p:grpSp>
+          <p:nvGrpSpPr>
+            <p:cNvPr id="8" name="Group 7"/>
+            <p:cNvGrpSpPr/>
+            <p:nvPr/>
+          </p:nvGrpSpPr>
+          <p:grpSpPr>
+            <a:xfrm>
+              <a:off x="4516999" y="716828"/>
+              <a:ext cx="3025082" cy="2575832"/>
+              <a:chOff x="4516999" y="716828"/>
+              <a:chExt cx="3025082" cy="2575832"/>
+            </a:xfrm>
+          </p:grpSpPr>
+          <p:sp>
+            <p:nvSpPr>
+              <p:cNvPr id="4" name="Rectangle 3"/>
+              <p:cNvSpPr/>
+              <p:nvPr/>
+            </p:nvSpPr>
+            <p:spPr>
+              <a:xfrm>
+                <a:off x="4516999" y="716828"/>
+                <a:ext cx="3025082" cy="2575832"/>
+              </a:xfrm>
+              <a:prstGeom prst="rect">
+                <a:avLst/>
+              </a:prstGeom>
+              <a:noFill/>
+              <a:ln>
+                <a:solidFill>
+                  <a:schemeClr val="tx1"/>
+                </a:solidFill>
+              </a:ln>
+            </p:spPr>
+            <p:style>
+              <a:lnRef idx="2">
+                <a:schemeClr val="accent1">
+                  <a:shade val="50000"/>
+                </a:schemeClr>
+              </a:lnRef>
+              <a:fillRef idx="1">
+                <a:schemeClr val="accent1"/>
+              </a:fillRef>
+              <a:effectRef idx="0">
+                <a:schemeClr val="accent1"/>
+              </a:effectRef>
+              <a:fontRef idx="minor">
+                <a:schemeClr val="lt1"/>
+              </a:fontRef>
+            </p:style>
+            <p:txBody>
+              <a:bodyPr rtlCol="0" anchor="ctr"/>
+              <a:lstStyle/>
+              <a:p>
+                <a:pPr algn="ctr"/>
+                <a:endParaRPr lang="en-US"/>
+              </a:p>
+            </p:txBody>
+          </p:sp>
+          <p:cxnSp>
+            <p:nvCxnSpPr>
+              <p:cNvPr id="13" name="Straight Connector 12"/>
+              <p:cNvCxnSpPr>
+                <a:cxnSpLocks/>
+              </p:cNvCxnSpPr>
+              <p:nvPr/>
+            </p:nvCxnSpPr>
+            <p:spPr>
+              <a:xfrm flipV="1">
+                <a:off x="4518467" y="2756109"/>
+                <a:ext cx="3023614" cy="1"/>
+              </a:xfrm>
+              <a:prstGeom prst="line">
+                <a:avLst/>
+              </a:prstGeom>
+              <a:ln w="12700">
+                <a:solidFill>
+                  <a:schemeClr val="tx1"/>
+                </a:solidFill>
+              </a:ln>
+            </p:spPr>
+            <p:style>
+              <a:lnRef idx="1">
+                <a:schemeClr val="accent1"/>
+              </a:lnRef>
+              <a:fillRef idx="0">
+                <a:schemeClr val="accent1"/>
+              </a:fillRef>
+              <a:effectRef idx="0">
+                <a:schemeClr val="accent1"/>
+              </a:effectRef>
+              <a:fontRef idx="minor">
+                <a:schemeClr val="tx1"/>
+              </a:fontRef>
+            </p:style>
+          </p:cxnSp>
+          <mc:AlternateContent xmlns:mc="http://schemas.openxmlformats.org/markup-compatibility/2006">
+            <mc:Choice xmlns:a14="http://schemas.microsoft.com/office/drawing/2010/main" Requires="a14">
+              <p:sp>
+                <p:nvSpPr>
+                  <p:cNvPr id="6" name="TextBox 5"/>
+                  <p:cNvSpPr txBox="1"/>
+                  <p:nvPr/>
+                </p:nvSpPr>
+                <p:spPr>
+                  <a:xfrm>
+                    <a:off x="4516999" y="2738662"/>
+                    <a:ext cx="2949456" cy="553998"/>
+                  </a:xfrm>
+                  <a:prstGeom prst="rect">
+                    <a:avLst/>
+                  </a:prstGeom>
+                  <a:noFill/>
+                </p:spPr>
+                <p:txBody>
+                  <a:bodyPr wrap="square" rtlCol="0">
+                    <a:spAutoFit/>
+                  </a:bodyPr>
+                  <a:lstStyle/>
+                  <a:p>
+                    <a:pPr algn="just"/>
+                    <a:r>
+                      <a:rPr lang="en-US" sz="1000" dirty="0">
+                        <a:latin typeface="Times New Roman" panose="02020603050405020304" pitchFamily="18" charset="0"/>
+                        <a:cs typeface="Times New Roman" panose="02020603050405020304" pitchFamily="18" charset="0"/>
+                      </a:rPr>
+                      <a:t>Figure 2. Geometry of an Alfvén wave. The was </a:t>
+                    </a:r>
+                    <a14:m>
+                      <m:oMath xmlns:m="http://schemas.openxmlformats.org/officeDocument/2006/math">
+                        <m:r>
+                          <a:rPr lang="en-US" sz="1000" b="1" i="1" smtClean="0">
+                            <a:latin typeface="Cambria Math" panose="02040503050406030204" pitchFamily="18" charset="0"/>
+                            <a:cs typeface="Times New Roman" panose="02020603050405020304" pitchFamily="18" charset="0"/>
+                          </a:rPr>
+                          <m:t>𝒌</m:t>
+                        </m:r>
+                      </m:oMath>
+                    </a14:m>
+                    <a:r>
+                      <a:rPr lang="en-US" sz="1000" b="1" dirty="0">
+                        <a:latin typeface="Times New Roman" panose="02020603050405020304" pitchFamily="18" charset="0"/>
+                        <a:cs typeface="Times New Roman" panose="02020603050405020304" pitchFamily="18" charset="0"/>
+                      </a:rPr>
+                      <a:t> </a:t>
+                    </a:r>
+                    <a:r>
+                      <a:rPr lang="en-US" sz="1000" dirty="0">
+                        <a:latin typeface="Times New Roman" panose="02020603050405020304" pitchFamily="18" charset="0"/>
+                        <a:cs typeface="Times New Roman" panose="02020603050405020304" pitchFamily="18" charset="0"/>
+                      </a:rPr>
+                      <a:t>along </a:t>
+                    </a:r>
+                    <a14:m>
+                      <m:oMath xmlns:m="http://schemas.openxmlformats.org/officeDocument/2006/math">
+                        <m:sSub>
+                          <m:sSubPr>
+                            <m:ctrlPr>
+                              <a:rPr lang="en-US" sz="1000" b="1" i="1" smtClean="0">
+                                <a:latin typeface="Cambria Math" panose="02040503050406030204" pitchFamily="18" charset="0"/>
+                                <a:cs typeface="Times New Roman" panose="02020603050405020304" pitchFamily="18" charset="0"/>
+                              </a:rPr>
+                            </m:ctrlPr>
+                          </m:sSubPr>
+                          <m:e>
+                            <m:r>
+                              <a:rPr lang="en-US" sz="1000" b="1" i="1" smtClean="0">
+                                <a:latin typeface="Cambria Math" panose="02040503050406030204" pitchFamily="18" charset="0"/>
+                                <a:cs typeface="Times New Roman" panose="02020603050405020304" pitchFamily="18" charset="0"/>
+                              </a:rPr>
+                              <m:t>𝑩</m:t>
+                            </m:r>
+                          </m:e>
+                          <m:sub>
+                            <m:r>
+                              <a:rPr lang="en-US" sz="1000" b="1" i="1" smtClean="0">
+                                <a:latin typeface="Cambria Math" panose="02040503050406030204" pitchFamily="18" charset="0"/>
+                                <a:cs typeface="Times New Roman" panose="02020603050405020304" pitchFamily="18" charset="0"/>
+                              </a:rPr>
+                              <m:t>𝟎</m:t>
+                            </m:r>
+                          </m:sub>
+                        </m:sSub>
+                      </m:oMath>
+                    </a14:m>
+                    <a:r>
+                      <a:rPr lang="en-US" sz="1000" dirty="0">
+                        <a:latin typeface="Times New Roman" panose="02020603050405020304" pitchFamily="18" charset="0"/>
+                        <a:cs typeface="Times New Roman" panose="02020603050405020304" pitchFamily="18" charset="0"/>
+                      </a:rPr>
+                      <a:t>, </a:t>
+                    </a:r>
+                    <a14:m>
+                      <m:oMath xmlns:m="http://schemas.openxmlformats.org/officeDocument/2006/math">
+                        <m:sSub>
+                          <m:sSubPr>
+                            <m:ctrlPr>
+                              <a:rPr lang="en-US" sz="1000" b="1" i="1" smtClean="0">
+                                <a:latin typeface="Cambria Math" panose="02040503050406030204" pitchFamily="18" charset="0"/>
+                                <a:cs typeface="Times New Roman" panose="02020603050405020304" pitchFamily="18" charset="0"/>
+                              </a:rPr>
+                            </m:ctrlPr>
+                          </m:sSubPr>
+                          <m:e>
+                            <m:r>
+                              <a:rPr lang="en-US" sz="1000" b="1" i="1" smtClean="0">
+                                <a:latin typeface="Cambria Math" panose="02040503050406030204" pitchFamily="18" charset="0"/>
+                                <a:cs typeface="Times New Roman" panose="02020603050405020304" pitchFamily="18" charset="0"/>
+                              </a:rPr>
+                              <m:t>𝑬</m:t>
+                            </m:r>
+                          </m:e>
+                          <m:sub>
+                            <m:r>
+                              <a:rPr lang="en-US" sz="1000" b="1" i="1" smtClean="0">
+                                <a:latin typeface="Cambria Math" panose="02040503050406030204" pitchFamily="18" charset="0"/>
+                                <a:cs typeface="Times New Roman" panose="02020603050405020304" pitchFamily="18" charset="0"/>
+                              </a:rPr>
+                              <m:t>𝟏</m:t>
+                            </m:r>
+                          </m:sub>
+                        </m:sSub>
+                      </m:oMath>
+                    </a14:m>
+                    <a:r>
+                      <a:rPr lang="en-US" sz="1000" b="1" dirty="0">
+                        <a:latin typeface="Times New Roman" panose="02020603050405020304" pitchFamily="18" charset="0"/>
+                        <a:cs typeface="Times New Roman" panose="02020603050405020304" pitchFamily="18" charset="0"/>
+                      </a:rPr>
+                      <a:t> </a:t>
+                    </a:r>
+                    <a:r>
+                      <a:rPr lang="en-US" sz="1000" dirty="0">
+                        <a:latin typeface="Times New Roman" panose="02020603050405020304" pitchFamily="18" charset="0"/>
+                        <a:cs typeface="Times New Roman" panose="02020603050405020304" pitchFamily="18" charset="0"/>
+                      </a:rPr>
+                      <a:t>and </a:t>
+                    </a:r>
+                    <a14:m>
+                      <m:oMath xmlns:m="http://schemas.openxmlformats.org/officeDocument/2006/math">
+                        <m:sSub>
+                          <m:sSubPr>
+                            <m:ctrlPr>
+                              <a:rPr lang="en-US" sz="1000" b="1" i="1" smtClean="0">
+                                <a:latin typeface="Cambria Math" panose="02040503050406030204" pitchFamily="18" charset="0"/>
+                                <a:cs typeface="Times New Roman" panose="02020603050405020304" pitchFamily="18" charset="0"/>
+                              </a:rPr>
+                            </m:ctrlPr>
+                          </m:sSubPr>
+                          <m:e>
+                            <m:r>
+                              <a:rPr lang="en-US" sz="1000" b="1" i="1" smtClean="0">
+                                <a:latin typeface="Cambria Math" panose="02040503050406030204" pitchFamily="18" charset="0"/>
+                                <a:cs typeface="Times New Roman" panose="02020603050405020304" pitchFamily="18" charset="0"/>
+                              </a:rPr>
+                              <m:t>𝒋</m:t>
+                            </m:r>
+                          </m:e>
+                          <m:sub>
+                            <m:r>
+                              <a:rPr lang="en-US" sz="1000" b="1" i="1" smtClean="0">
+                                <a:latin typeface="Cambria Math" panose="02040503050406030204" pitchFamily="18" charset="0"/>
+                                <a:cs typeface="Times New Roman" panose="02020603050405020304" pitchFamily="18" charset="0"/>
+                              </a:rPr>
+                              <m:t>𝟏</m:t>
+                            </m:r>
+                          </m:sub>
+                        </m:sSub>
+                      </m:oMath>
+                    </a14:m>
+                    <a:r>
+                      <a:rPr lang="en-US" sz="1000" dirty="0">
+                        <a:latin typeface="Times New Roman" panose="02020603050405020304" pitchFamily="18" charset="0"/>
+                        <a:cs typeface="Times New Roman" panose="02020603050405020304" pitchFamily="18" charset="0"/>
+                      </a:rPr>
+                      <a:t> perpendicular to </a:t>
+                    </a:r>
+                    <a14:m>
+                      <m:oMath xmlns:m="http://schemas.openxmlformats.org/officeDocument/2006/math">
+                        <m:sSub>
+                          <m:sSubPr>
+                            <m:ctrlPr>
+                              <a:rPr lang="en-US" sz="1000" b="1" i="1" smtClean="0">
+                                <a:latin typeface="Cambria Math" panose="02040503050406030204" pitchFamily="18" charset="0"/>
+                                <a:cs typeface="Times New Roman" panose="02020603050405020304" pitchFamily="18" charset="0"/>
+                              </a:rPr>
+                            </m:ctrlPr>
+                          </m:sSubPr>
+                          <m:e>
+                            <m:r>
+                              <a:rPr lang="en-US" sz="1000" b="1" i="1" smtClean="0">
+                                <a:latin typeface="Cambria Math" panose="02040503050406030204" pitchFamily="18" charset="0"/>
+                                <a:cs typeface="Times New Roman" panose="02020603050405020304" pitchFamily="18" charset="0"/>
+                              </a:rPr>
+                              <m:t>𝑩</m:t>
+                            </m:r>
+                          </m:e>
+                          <m:sub>
+                            <m:r>
+                              <a:rPr lang="en-US" sz="1000" b="1" i="1" smtClean="0">
+                                <a:latin typeface="Cambria Math" panose="02040503050406030204" pitchFamily="18" charset="0"/>
+                                <a:cs typeface="Times New Roman" panose="02020603050405020304" pitchFamily="18" charset="0"/>
+                              </a:rPr>
+                              <m:t>𝟎</m:t>
+                            </m:r>
+                          </m:sub>
+                        </m:sSub>
+                      </m:oMath>
+                    </a14:m>
+                    <a:r>
+                      <a:rPr lang="en-US" sz="1000" b="1" dirty="0">
+                        <a:latin typeface="Times New Roman" panose="02020603050405020304" pitchFamily="18" charset="0"/>
+                        <a:cs typeface="Times New Roman" panose="02020603050405020304" pitchFamily="18" charset="0"/>
+                      </a:rPr>
+                      <a:t> </a:t>
+                    </a:r>
+                    <a:r>
+                      <a:rPr lang="en-US" sz="1000" dirty="0">
+                        <a:latin typeface="Times New Roman" panose="02020603050405020304" pitchFamily="18" charset="0"/>
+                        <a:cs typeface="Times New Roman" panose="02020603050405020304" pitchFamily="18" charset="0"/>
+                      </a:rPr>
+                      <a:t>and </a:t>
+                    </a:r>
+                    <a14:m>
+                      <m:oMath xmlns:m="http://schemas.openxmlformats.org/officeDocument/2006/math">
+                        <m:sSub>
+                          <m:sSubPr>
+                            <m:ctrlPr>
+                              <a:rPr lang="en-US" sz="1000" b="1" i="1" smtClean="0">
+                                <a:latin typeface="Cambria Math" panose="02040503050406030204" pitchFamily="18" charset="0"/>
+                                <a:cs typeface="Times New Roman" panose="02020603050405020304" pitchFamily="18" charset="0"/>
+                              </a:rPr>
+                            </m:ctrlPr>
+                          </m:sSubPr>
+                          <m:e>
+                            <m:r>
+                              <a:rPr lang="en-US" sz="1000" b="1" i="1" smtClean="0">
+                                <a:latin typeface="Cambria Math" panose="02040503050406030204" pitchFamily="18" charset="0"/>
+                                <a:cs typeface="Times New Roman" panose="02020603050405020304" pitchFamily="18" charset="0"/>
+                              </a:rPr>
+                              <m:t>𝑩</m:t>
+                            </m:r>
+                          </m:e>
+                          <m:sub>
+                            <m:r>
+                              <a:rPr lang="en-US" sz="1000" b="1" i="1" smtClean="0">
+                                <a:latin typeface="Cambria Math" panose="02040503050406030204" pitchFamily="18" charset="0"/>
+                                <a:cs typeface="Times New Roman" panose="02020603050405020304" pitchFamily="18" charset="0"/>
+                              </a:rPr>
+                              <m:t>𝟏</m:t>
+                            </m:r>
+                          </m:sub>
+                        </m:sSub>
+                      </m:oMath>
+                    </a14:m>
+                    <a:r>
+                      <a:rPr lang="en-US" sz="1000" b="1" dirty="0">
+                        <a:latin typeface="Times New Roman" panose="02020603050405020304" pitchFamily="18" charset="0"/>
+                        <a:cs typeface="Times New Roman" panose="02020603050405020304" pitchFamily="18" charset="0"/>
+                      </a:rPr>
+                      <a:t> </a:t>
+                    </a:r>
+                    <a:r>
+                      <a:rPr lang="en-US" sz="1000" dirty="0">
+                        <a:latin typeface="Times New Roman" panose="02020603050405020304" pitchFamily="18" charset="0"/>
+                        <a:cs typeface="Times New Roman" panose="02020603050405020304" pitchFamily="18" charset="0"/>
+                      </a:rPr>
+                      <a:t>and </a:t>
+                    </a:r>
+                    <a14:m>
+                      <m:oMath xmlns:m="http://schemas.openxmlformats.org/officeDocument/2006/math">
+                        <m:sSub>
+                          <m:sSubPr>
+                            <m:ctrlPr>
+                              <a:rPr lang="en-US" sz="1000" b="1" i="1" smtClean="0">
+                                <a:latin typeface="Cambria Math" panose="02040503050406030204" pitchFamily="18" charset="0"/>
+                                <a:cs typeface="Times New Roman" panose="02020603050405020304" pitchFamily="18" charset="0"/>
+                              </a:rPr>
+                            </m:ctrlPr>
+                          </m:sSubPr>
+                          <m:e>
+                            <m:r>
+                              <a:rPr lang="en-US" sz="1000" b="1" i="1" smtClean="0">
+                                <a:latin typeface="Cambria Math" panose="02040503050406030204" pitchFamily="18" charset="0"/>
+                                <a:cs typeface="Times New Roman" panose="02020603050405020304" pitchFamily="18" charset="0"/>
+                              </a:rPr>
+                              <m:t>𝒗</m:t>
+                            </m:r>
+                          </m:e>
+                          <m:sub>
+                            <m:r>
+                              <a:rPr lang="en-US" sz="1000" b="1" i="1" smtClean="0">
+                                <a:latin typeface="Cambria Math" panose="02040503050406030204" pitchFamily="18" charset="0"/>
+                                <a:cs typeface="Times New Roman" panose="02020603050405020304" pitchFamily="18" charset="0"/>
+                              </a:rPr>
+                              <m:t>𝟏</m:t>
+                            </m:r>
+                          </m:sub>
+                        </m:sSub>
+                      </m:oMath>
+                    </a14:m>
+                    <a:r>
+                      <a:rPr lang="en-US" sz="1000" b="1" dirty="0">
+                        <a:latin typeface="Times New Roman" panose="02020603050405020304" pitchFamily="18" charset="0"/>
+                        <a:cs typeface="Times New Roman" panose="02020603050405020304" pitchFamily="18" charset="0"/>
+                      </a:rPr>
+                      <a:t> </a:t>
+                    </a:r>
+                    <a:r>
+                      <a:rPr lang="en-US" sz="1000" dirty="0">
+                        <a:latin typeface="Times New Roman" panose="02020603050405020304" pitchFamily="18" charset="0"/>
+                        <a:cs typeface="Times New Roman" panose="02020603050405020304" pitchFamily="18" charset="0"/>
+                      </a:rPr>
+                      <a:t>perpendicular to both </a:t>
+                    </a:r>
+                    <a14:m>
+                      <m:oMath xmlns:m="http://schemas.openxmlformats.org/officeDocument/2006/math">
+                        <m:sSub>
+                          <m:sSubPr>
+                            <m:ctrlPr>
+                              <a:rPr lang="en-US" sz="1000" b="1" i="1" smtClean="0">
+                                <a:latin typeface="Cambria Math" panose="02040503050406030204" pitchFamily="18" charset="0"/>
+                                <a:cs typeface="Times New Roman" panose="02020603050405020304" pitchFamily="18" charset="0"/>
+                              </a:rPr>
+                            </m:ctrlPr>
+                          </m:sSubPr>
+                          <m:e>
+                            <m:r>
+                              <a:rPr lang="en-US" sz="1000" b="1" i="1" smtClean="0">
+                                <a:latin typeface="Cambria Math" panose="02040503050406030204" pitchFamily="18" charset="0"/>
+                                <a:cs typeface="Times New Roman" panose="02020603050405020304" pitchFamily="18" charset="0"/>
+                              </a:rPr>
+                              <m:t>𝑩</m:t>
+                            </m:r>
+                          </m:e>
+                          <m:sub>
+                            <m:r>
+                              <a:rPr lang="en-US" sz="1000" b="1" i="1" smtClean="0">
+                                <a:latin typeface="Cambria Math" panose="02040503050406030204" pitchFamily="18" charset="0"/>
+                                <a:cs typeface="Times New Roman" panose="02020603050405020304" pitchFamily="18" charset="0"/>
+                              </a:rPr>
+                              <m:t>𝟎</m:t>
+                            </m:r>
+                          </m:sub>
+                        </m:sSub>
+                      </m:oMath>
+                    </a14:m>
+                    <a:r>
+                      <a:rPr lang="en-US" sz="1000" b="1" dirty="0">
+                        <a:latin typeface="Times New Roman" panose="02020603050405020304" pitchFamily="18" charset="0"/>
+                        <a:cs typeface="Times New Roman" panose="02020603050405020304" pitchFamily="18" charset="0"/>
+                      </a:rPr>
+                      <a:t> </a:t>
+                    </a:r>
+                    <a:r>
+                      <a:rPr lang="en-US" sz="1000" dirty="0">
+                        <a:latin typeface="Times New Roman" panose="02020603050405020304" pitchFamily="18" charset="0"/>
+                        <a:cs typeface="Times New Roman" panose="02020603050405020304" pitchFamily="18" charset="0"/>
+                      </a:rPr>
+                      <a:t>and </a:t>
+                    </a:r>
+                    <a14:m>
+                      <m:oMath xmlns:m="http://schemas.openxmlformats.org/officeDocument/2006/math">
+                        <m:sSub>
+                          <m:sSubPr>
+                            <m:ctrlPr>
+                              <a:rPr lang="en-US" sz="1000" b="1" i="1" smtClean="0">
+                                <a:latin typeface="Cambria Math" panose="02040503050406030204" pitchFamily="18" charset="0"/>
+                                <a:cs typeface="Times New Roman" panose="02020603050405020304" pitchFamily="18" charset="0"/>
+                              </a:rPr>
+                            </m:ctrlPr>
+                          </m:sSubPr>
+                          <m:e>
+                            <m:r>
+                              <a:rPr lang="en-US" sz="1000" b="1" i="1" smtClean="0">
+                                <a:latin typeface="Cambria Math" panose="02040503050406030204" pitchFamily="18" charset="0"/>
+                                <a:cs typeface="Times New Roman" panose="02020603050405020304" pitchFamily="18" charset="0"/>
+                              </a:rPr>
+                              <m:t>𝑬</m:t>
+                            </m:r>
+                          </m:e>
+                          <m:sub>
+                            <m:r>
+                              <a:rPr lang="en-US" sz="1000" b="1" i="1" smtClean="0">
+                                <a:latin typeface="Cambria Math" panose="02040503050406030204" pitchFamily="18" charset="0"/>
+                                <a:cs typeface="Times New Roman" panose="02020603050405020304" pitchFamily="18" charset="0"/>
+                              </a:rPr>
+                              <m:t>𝟏</m:t>
+                            </m:r>
+                          </m:sub>
+                        </m:sSub>
+                      </m:oMath>
+                    </a14:m>
+                    <a:r>
+                      <a:rPr lang="en-US" sz="1000" dirty="0">
+                        <a:latin typeface="Times New Roman" panose="02020603050405020304" pitchFamily="18" charset="0"/>
+                        <a:cs typeface="Times New Roman" panose="02020603050405020304" pitchFamily="18" charset="0"/>
+                      </a:rPr>
+                      <a:t>.</a:t>
+                    </a:r>
+                    <a:endParaRPr lang="en-US" sz="1000" b="1" dirty="0">
+                      <a:latin typeface="Times New Roman" panose="02020603050405020304" pitchFamily="18" charset="0"/>
+                      <a:cs typeface="Times New Roman" panose="02020603050405020304" pitchFamily="18" charset="0"/>
+                    </a:endParaRPr>
+                  </a:p>
+                </p:txBody>
+              </p:sp>
+            </mc:Choice>
+            <mc:Fallback>
+              <p:sp>
+                <p:nvSpPr>
+                  <p:cNvPr id="6" name="TextBox 5"/>
+                  <p:cNvSpPr txBox="1">
+                    <a:spLocks noRot="1" noChangeAspect="1" noMove="1" noResize="1" noEditPoints="1" noAdjustHandles="1" noChangeArrowheads="1" noChangeShapeType="1" noTextEdit="1"/>
+                  </p:cNvSpPr>
+                  <p:nvPr/>
+                </p:nvSpPr>
+                <p:spPr>
+                  <a:xfrm>
+                    <a:off x="4516999" y="2738662"/>
+                    <a:ext cx="2949456" cy="553998"/>
+                  </a:xfrm>
+                  <a:prstGeom prst="rect">
+                    <a:avLst/>
+                  </a:prstGeom>
+                  <a:blipFill>
+                    <a:blip r:embed="rId3"/>
+                    <a:stretch>
+                      <a:fillRect b="-5495"/>
+                    </a:stretch>
+                  </a:blipFill>
+                </p:spPr>
+                <p:txBody>
+                  <a:bodyPr/>
+                  <a:lstStyle/>
+                  <a:p>
+                    <a:r>
+                      <a:rPr lang="en-US">
+                        <a:noFill/>
+                      </a:rPr>
+                      <a:t> </a:t>
+                    </a:r>
+                  </a:p>
+                </p:txBody>
+              </p:sp>
+            </mc:Fallback>
+          </mc:AlternateContent>
+        </p:grpSp>
+      </p:grpSp>
+      <p:grpSp>
+        <p:nvGrpSpPr>
           <p:cNvPr id="22" name="Group 21"/>
           <p:cNvGrpSpPr/>
           <p:nvPr/>
         </p:nvGrpSpPr>
         <p:grpSpPr>
           <a:xfrm>
-            <a:off x="937207" y="2004767"/>
+            <a:off x="223975" y="194255"/>
             <a:ext cx="2886075" cy="2122804"/>
             <a:chOff x="0" y="0"/>
             <a:chExt cx="2886439" cy="2167214"/>
@@ -2985,7 +3578,7 @@
               <p:nvPr/>
             </p:nvPicPr>
             <p:blipFill>
-              <a:blip r:embed="rId2">
+              <a:blip r:embed="rId4">
                 <a:extLst>
                   <a:ext uri="{28A0092B-C50C-407E-A947-70E740481C1C}">
                     <a14:useLocalDpi xmlns:a14="http://schemas.microsoft.com/office/drawing/2010/main" val="0"/>
@@ -3006,8 +3599,8 @@
               </a:prstGeom>
             </p:spPr>
           </p:pic>
-          <mc:AlternateContent xmlns:mc="http://schemas.openxmlformats.org/markup-compatibility/2006">
-            <mc:Choice xmlns:a14="http://schemas.microsoft.com/office/drawing/2010/main" Requires="a14">
+          <mc:AlternateContent xmlns:mc="http://schemas.openxmlformats.org/markup-compatibility/2006" xmlns:a14="http://schemas.microsoft.com/office/drawing/2010/main">
+            <mc:Choice Requires="a14">
               <p:sp>
                 <p:nvSpPr>
                   <p:cNvPr id="28" name="TextBox 5"/>
@@ -3068,7 +3661,7 @@
                 </p:txBody>
               </p:sp>
             </mc:Choice>
-            <mc:Fallback>
+            <mc:Fallback xmlns="">
               <p:sp>
                 <p:nvSpPr>
                   <p:cNvPr id="28" name="TextBox 5"/>
@@ -3086,7 +3679,7 @@
                     <a:avLst/>
                   </a:prstGeom>
                   <a:blipFill>
-                    <a:blip r:embed="rId3"/>
+                    <a:blip r:embed="rId5"/>
                     <a:stretch>
                       <a:fillRect/>
                     </a:stretch>
@@ -3186,7 +3779,7 @@
                 </a:spcAft>
               </a:pPr>
               <a:r>
-                <a:rPr lang="en-US" sz="1000" kern="1200">
+                <a:rPr lang="en-US" sz="1000" kern="1200" dirty="0">
                   <a:solidFill>
                     <a:srgbClr val="000000"/>
                   </a:solidFill>
@@ -3196,7 +3789,7 @@
                 </a:rPr>
                 <a:t>Figure 1. Graphical representation of the path of a charged particle (blue) travelling along a magnetic field line (yellow).</a:t>
               </a:r>
-              <a:endParaRPr lang="en-US" sz="1200">
+              <a:endParaRPr lang="en-US" sz="1200" dirty="0">
                 <a:effectLst/>
                 <a:latin typeface="Times New Roman" panose="02020603050405020304" pitchFamily="18" charset="0"/>
                 <a:ea typeface="Times New Roman" panose="02020603050405020304" pitchFamily="18" charset="0"/>

</xml_diff>

<commit_message>
Added clustering example figure.
</commit_message>
<xml_diff>
--- a/Writing/Figs.pptx
+++ b/Writing/Figs.pptx
@@ -242,7 +242,7 @@
           <a:p>
             <a:fld id="{D5436C50-0FB6-4D02-BEC8-AE142D0D2100}" type="datetimeFigureOut">
               <a:rPr lang="en-US" smtClean="0"/>
-              <a:t>5/16/2017</a:t>
+              <a:t>5/24/2017</a:t>
             </a:fld>
             <a:endParaRPr lang="en-US"/>
           </a:p>
@@ -410,7 +410,7 @@
           <a:p>
             <a:fld id="{D5436C50-0FB6-4D02-BEC8-AE142D0D2100}" type="datetimeFigureOut">
               <a:rPr lang="en-US" smtClean="0"/>
-              <a:t>5/16/2017</a:t>
+              <a:t>5/24/2017</a:t>
             </a:fld>
             <a:endParaRPr lang="en-US"/>
           </a:p>
@@ -588,7 +588,7 @@
           <a:p>
             <a:fld id="{D5436C50-0FB6-4D02-BEC8-AE142D0D2100}" type="datetimeFigureOut">
               <a:rPr lang="en-US" smtClean="0"/>
-              <a:t>5/16/2017</a:t>
+              <a:t>5/24/2017</a:t>
             </a:fld>
             <a:endParaRPr lang="en-US"/>
           </a:p>
@@ -756,7 +756,7 @@
           <a:p>
             <a:fld id="{D5436C50-0FB6-4D02-BEC8-AE142D0D2100}" type="datetimeFigureOut">
               <a:rPr lang="en-US" smtClean="0"/>
-              <a:t>5/16/2017</a:t>
+              <a:t>5/24/2017</a:t>
             </a:fld>
             <a:endParaRPr lang="en-US"/>
           </a:p>
@@ -1001,7 +1001,7 @@
           <a:p>
             <a:fld id="{D5436C50-0FB6-4D02-BEC8-AE142D0D2100}" type="datetimeFigureOut">
               <a:rPr lang="en-US" smtClean="0"/>
-              <a:t>5/16/2017</a:t>
+              <a:t>5/24/2017</a:t>
             </a:fld>
             <a:endParaRPr lang="en-US"/>
           </a:p>
@@ -1230,7 +1230,7 @@
           <a:p>
             <a:fld id="{D5436C50-0FB6-4D02-BEC8-AE142D0D2100}" type="datetimeFigureOut">
               <a:rPr lang="en-US" smtClean="0"/>
-              <a:t>5/16/2017</a:t>
+              <a:t>5/24/2017</a:t>
             </a:fld>
             <a:endParaRPr lang="en-US"/>
           </a:p>
@@ -1594,7 +1594,7 @@
           <a:p>
             <a:fld id="{D5436C50-0FB6-4D02-BEC8-AE142D0D2100}" type="datetimeFigureOut">
               <a:rPr lang="en-US" smtClean="0"/>
-              <a:t>5/16/2017</a:t>
+              <a:t>5/24/2017</a:t>
             </a:fld>
             <a:endParaRPr lang="en-US"/>
           </a:p>
@@ -1711,7 +1711,7 @@
           <a:p>
             <a:fld id="{D5436C50-0FB6-4D02-BEC8-AE142D0D2100}" type="datetimeFigureOut">
               <a:rPr lang="en-US" smtClean="0"/>
-              <a:t>5/16/2017</a:t>
+              <a:t>5/24/2017</a:t>
             </a:fld>
             <a:endParaRPr lang="en-US"/>
           </a:p>
@@ -1806,7 +1806,7 @@
           <a:p>
             <a:fld id="{D5436C50-0FB6-4D02-BEC8-AE142D0D2100}" type="datetimeFigureOut">
               <a:rPr lang="en-US" smtClean="0"/>
-              <a:t>5/16/2017</a:t>
+              <a:t>5/24/2017</a:t>
             </a:fld>
             <a:endParaRPr lang="en-US"/>
           </a:p>
@@ -2081,7 +2081,7 @@
           <a:p>
             <a:fld id="{D5436C50-0FB6-4D02-BEC8-AE142D0D2100}" type="datetimeFigureOut">
               <a:rPr lang="en-US" smtClean="0"/>
-              <a:t>5/16/2017</a:t>
+              <a:t>5/24/2017</a:t>
             </a:fld>
             <a:endParaRPr lang="en-US"/>
           </a:p>
@@ -2333,7 +2333,7 @@
           <a:p>
             <a:fld id="{D5436C50-0FB6-4D02-BEC8-AE142D0D2100}" type="datetimeFigureOut">
               <a:rPr lang="en-US" smtClean="0"/>
-              <a:t>5/16/2017</a:t>
+              <a:t>5/24/2017</a:t>
             </a:fld>
             <a:endParaRPr lang="en-US"/>
           </a:p>
@@ -2544,7 +2544,7 @@
           <a:p>
             <a:fld id="{D5436C50-0FB6-4D02-BEC8-AE142D0D2100}" type="datetimeFigureOut">
               <a:rPr lang="en-US" smtClean="0"/>
-              <a:t>5/16/2017</a:t>
+              <a:t>5/24/2017</a:t>
             </a:fld>
             <a:endParaRPr lang="en-US"/>
           </a:p>
@@ -3894,7 +3894,7 @@
         </p:nvGrpSpPr>
         <p:grpSpPr>
           <a:xfrm>
-            <a:off x="6164354" y="187439"/>
+            <a:off x="8593465" y="336677"/>
             <a:ext cx="3078503" cy="3780086"/>
             <a:chOff x="618767" y="3224783"/>
             <a:chExt cx="3078503" cy="3780086"/>
@@ -4038,10 +4038,13 @@
               <a:pPr algn="just"/>
               <a:r>
                 <a:rPr lang="en-US" sz="1000" dirty="0">
+                  <a:solidFill>
+                    <a:srgbClr val="FF0000"/>
+                  </a:solidFill>
                   <a:latin typeface="Times New Roman" panose="02020603050405020304" pitchFamily="18" charset="0"/>
                   <a:cs typeface="Times New Roman" panose="02020603050405020304" pitchFamily="18" charset="0"/>
                 </a:rPr>
-                <a:t>Figure 3. Cartoon of a tokamak device with plasma shown in purple. The blue toroidal field coils produce a strong magnetic field in the toroidal direction. Similarly, the green and grey poloidal field coils create a magnetic field in the poloidal field. The toroidal and poloidal fields combine to form a closed helical magnetic field  in the toroidal direction.</a:t>
+                <a:t>Not Used. Cartoon of a tokamak device with plasma shown in purple. The blue toroidal field coils produce a strong magnetic field in the toroidal direction. Similarly, the green and grey poloidal field coils create a magnetic field in the poloidal field. The toroidal and poloidal fields combine to form a closed helical magnetic field  in the toroidal direction.</a:t>
               </a:r>
             </a:p>
           </p:txBody>
@@ -4225,25 +4228,186 @@
                   <a:latin typeface="Times New Roman" panose="02020603050405020304" pitchFamily="18" charset="0"/>
                   <a:cs typeface="Times New Roman" panose="02020603050405020304" pitchFamily="18" charset="0"/>
                 </a:rPr>
-                <a:t>Figure 4. </a:t>
-              </a:r>
-              <a:r>
-                <a:rPr lang="en-US" sz="1000">
-                  <a:latin typeface="Times New Roman" panose="02020603050405020304" pitchFamily="18" charset="0"/>
-                  <a:cs typeface="Times New Roman" panose="02020603050405020304" pitchFamily="18" charset="0"/>
-                </a:rPr>
-                <a:t>Cartoon of top down view of </a:t>
-              </a:r>
-              <a:r>
-                <a:rPr lang="en-US" sz="1000" dirty="0">
-                  <a:latin typeface="Times New Roman" panose="02020603050405020304" pitchFamily="18" charset="0"/>
-                  <a:cs typeface="Times New Roman" panose="02020603050405020304" pitchFamily="18" charset="0"/>
-                </a:rPr>
-                <a:t>DIII-D. The 4-pairs of neutral beam injectors are shown in purple and the various toroidal magnetic Mirnov probes are shown in green with their angular position indicated.</a:t>
+                <a:t>Figure 3. Cartoon of top down view of DIII-D. The 4-pairs of neutral beam injectors are shown in purple and the various toroidal magnetic Mirnov probes are shown in green with their angular position indicated.</a:t>
               </a:r>
             </a:p>
           </p:txBody>
         </p:sp>
+      </p:grpSp>
+      <p:grpSp>
+        <p:nvGrpSpPr>
+          <p:cNvPr id="11" name="Group 10"/>
+          <p:cNvGrpSpPr/>
+          <p:nvPr/>
+        </p:nvGrpSpPr>
+        <p:grpSpPr>
+          <a:xfrm>
+            <a:off x="5672028" y="185738"/>
+            <a:ext cx="5273271" cy="4900803"/>
+            <a:chOff x="5672028" y="185738"/>
+            <a:chExt cx="5273271" cy="4900803"/>
+          </a:xfrm>
+        </p:grpSpPr>
+        <p:pic>
+          <p:nvPicPr>
+            <p:cNvPr id="10" name="Picture 9" descr="A close up of a map&#10;&#10;Description generated with high confidence"/>
+            <p:cNvPicPr>
+              <a:picLocks noChangeAspect="1"/>
+            </p:cNvPicPr>
+            <p:nvPr/>
+          </p:nvPicPr>
+          <p:blipFill rotWithShape="1">
+            <a:blip r:embed="rId3">
+              <a:extLst>
+                <a:ext uri="{28A0092B-C50C-407E-A947-70E740481C1C}">
+                  <a14:useLocalDpi xmlns:a14="http://schemas.microsoft.com/office/drawing/2010/main" val="0"/>
+                </a:ext>
+              </a:extLst>
+            </a:blip>
+            <a:srcRect l="6392" r="8968"/>
+            <a:stretch/>
+          </p:blipFill>
+          <p:spPr>
+            <a:xfrm>
+              <a:off x="5672028" y="185738"/>
+              <a:ext cx="5110293" cy="4566691"/>
+            </a:xfrm>
+            <a:prstGeom prst="rect">
+              <a:avLst/>
+            </a:prstGeom>
+          </p:spPr>
+        </p:pic>
+        <p:grpSp>
+          <p:nvGrpSpPr>
+            <p:cNvPr id="5" name="Group 4"/>
+            <p:cNvGrpSpPr/>
+            <p:nvPr/>
+          </p:nvGrpSpPr>
+          <p:grpSpPr>
+            <a:xfrm>
+              <a:off x="5672030" y="382209"/>
+              <a:ext cx="5273269" cy="4704332"/>
+              <a:chOff x="4963886" y="343760"/>
+              <a:chExt cx="5273269" cy="4704332"/>
+            </a:xfrm>
+          </p:grpSpPr>
+          <p:sp>
+            <p:nvSpPr>
+              <p:cNvPr id="8" name="Rectangle 7"/>
+              <p:cNvSpPr/>
+              <p:nvPr/>
+            </p:nvSpPr>
+            <p:spPr>
+              <a:xfrm>
+                <a:off x="4963887" y="343760"/>
+                <a:ext cx="5273268" cy="4704332"/>
+              </a:xfrm>
+              <a:prstGeom prst="rect">
+                <a:avLst/>
+              </a:prstGeom>
+              <a:noFill/>
+              <a:ln>
+                <a:solidFill>
+                  <a:schemeClr val="tx1"/>
+                </a:solidFill>
+              </a:ln>
+            </p:spPr>
+            <p:style>
+              <a:lnRef idx="2">
+                <a:schemeClr val="accent1">
+                  <a:shade val="50000"/>
+                </a:schemeClr>
+              </a:lnRef>
+              <a:fillRef idx="1">
+                <a:schemeClr val="accent1"/>
+              </a:fillRef>
+              <a:effectRef idx="0">
+                <a:schemeClr val="accent1"/>
+              </a:effectRef>
+              <a:fontRef idx="minor">
+                <a:schemeClr val="lt1"/>
+              </a:fontRef>
+            </p:style>
+            <p:txBody>
+              <a:bodyPr rtlCol="0" anchor="ctr"/>
+              <a:lstStyle/>
+              <a:p>
+                <a:pPr algn="ctr"/>
+                <a:endParaRPr lang="en-US"/>
+              </a:p>
+            </p:txBody>
+          </p:sp>
+          <p:cxnSp>
+            <p:nvCxnSpPr>
+              <p:cNvPr id="3" name="Straight Connector 2"/>
+              <p:cNvCxnSpPr>
+                <a:cxnSpLocks/>
+              </p:cNvCxnSpPr>
+              <p:nvPr/>
+            </p:nvCxnSpPr>
+            <p:spPr>
+              <a:xfrm>
+                <a:off x="4963886" y="4655025"/>
+                <a:ext cx="5273268" cy="0"/>
+              </a:xfrm>
+              <a:prstGeom prst="line">
+                <a:avLst/>
+              </a:prstGeom>
+              <a:ln w="12700">
+                <a:solidFill>
+                  <a:schemeClr val="tx1"/>
+                </a:solidFill>
+              </a:ln>
+            </p:spPr>
+            <p:style>
+              <a:lnRef idx="1">
+                <a:schemeClr val="accent1"/>
+              </a:lnRef>
+              <a:fillRef idx="0">
+                <a:schemeClr val="accent1"/>
+              </a:fillRef>
+              <a:effectRef idx="0">
+                <a:schemeClr val="accent1"/>
+              </a:effectRef>
+              <a:fontRef idx="minor">
+                <a:schemeClr val="tx1"/>
+              </a:fontRef>
+            </p:style>
+          </p:cxnSp>
+          <p:sp>
+            <p:nvSpPr>
+              <p:cNvPr id="4" name="TextBox 3"/>
+              <p:cNvSpPr txBox="1"/>
+              <p:nvPr/>
+            </p:nvSpPr>
+            <p:spPr>
+              <a:xfrm>
+                <a:off x="4963886" y="4647981"/>
+                <a:ext cx="5273268" cy="400110"/>
+              </a:xfrm>
+              <a:prstGeom prst="rect">
+                <a:avLst/>
+              </a:prstGeom>
+              <a:noFill/>
+            </p:spPr>
+            <p:txBody>
+              <a:bodyPr wrap="square" rtlCol="0">
+                <a:spAutoFit/>
+              </a:bodyPr>
+              <a:lstStyle/>
+              <a:p>
+                <a:pPr algn="just"/>
+                <a:r>
+                  <a:rPr lang="en-US" sz="1000" dirty="0">
+                    <a:latin typeface="Times New Roman" panose="02020603050405020304" pitchFamily="18" charset="0"/>
+                    <a:cs typeface="Times New Roman" panose="02020603050405020304" pitchFamily="18" charset="0"/>
+                  </a:rPr>
+                  <a:t>Figure 5. Sample output from ClusteringExample.py using 1000 random data points and a k-means algorithm with 7 total clusters. </a:t>
+                </a:r>
+              </a:p>
+            </p:txBody>
+          </p:sp>
+        </p:grpSp>
       </p:grpSp>
     </p:spTree>
     <p:extLst>

</xml_diff>